<commit_message>
Added Sanger sequences for task2 strains
</commit_message>
<xml_diff>
--- a/SeedBanks/Talks/FallLabTalk.pptx
+++ b/SeedBanks/Talks/FallLabTalk.pptx
@@ -13,24 +13,25 @@
     <p:sldId id="267" r:id="rId7"/>
     <p:sldId id="278" r:id="rId8"/>
     <p:sldId id="264" r:id="rId9"/>
-    <p:sldId id="281" r:id="rId10"/>
-    <p:sldId id="279" r:id="rId11"/>
-    <p:sldId id="280" r:id="rId12"/>
+    <p:sldId id="280" r:id="rId10"/>
+    <p:sldId id="281" r:id="rId11"/>
+    <p:sldId id="279" r:id="rId12"/>
     <p:sldId id="266" r:id="rId13"/>
     <p:sldId id="257" r:id="rId14"/>
     <p:sldId id="275" r:id="rId15"/>
     <p:sldId id="276" r:id="rId16"/>
-    <p:sldId id="265" r:id="rId17"/>
-    <p:sldId id="258" r:id="rId18"/>
-    <p:sldId id="260" r:id="rId19"/>
-    <p:sldId id="272" r:id="rId20"/>
-    <p:sldId id="277" r:id="rId21"/>
-    <p:sldId id="273" r:id="rId22"/>
-    <p:sldId id="259" r:id="rId23"/>
-    <p:sldId id="269" r:id="rId24"/>
-    <p:sldId id="271" r:id="rId25"/>
-    <p:sldId id="270" r:id="rId26"/>
-    <p:sldId id="274" r:id="rId27"/>
+    <p:sldId id="282" r:id="rId17"/>
+    <p:sldId id="265" r:id="rId18"/>
+    <p:sldId id="258" r:id="rId19"/>
+    <p:sldId id="260" r:id="rId20"/>
+    <p:sldId id="272" r:id="rId21"/>
+    <p:sldId id="277" r:id="rId22"/>
+    <p:sldId id="273" r:id="rId23"/>
+    <p:sldId id="259" r:id="rId24"/>
+    <p:sldId id="269" r:id="rId25"/>
+    <p:sldId id="271" r:id="rId26"/>
+    <p:sldId id="270" r:id="rId27"/>
+    <p:sldId id="274" r:id="rId28"/>
   </p:sldIdLst>
   <p:sldSz cx="9144000" cy="6858000" type="screen4x3"/>
   <p:notesSz cx="6858000" cy="9144000"/>
@@ -3208,48 +3209,34 @@
           <a:chExt cx="0" cy="0"/>
         </a:xfrm>
       </p:grpSpPr>
-      <p:sp>
-        <p:nvSpPr>
-          <p:cNvPr id="2" name="Title 1"/>
-          <p:cNvSpPr>
-            <a:spLocks noGrp="1"/>
-          </p:cNvSpPr>
-          <p:nvPr>
-            <p:ph type="title"/>
-          </p:nvPr>
-        </p:nvSpPr>
-        <p:spPr/>
-        <p:txBody>
-          <a:bodyPr/>
-          <a:lstStyle/>
-          <a:p>
-            <a:endParaRPr lang="en-US"/>
-          </a:p>
-        </p:txBody>
-      </p:sp>
-      <p:sp>
-        <p:nvSpPr>
-          <p:cNvPr id="3" name="Content Placeholder 2"/>
-          <p:cNvSpPr>
-            <a:spLocks noGrp="1"/>
-          </p:cNvSpPr>
-          <p:nvPr>
-            <p:ph idx="1"/>
-          </p:nvPr>
-        </p:nvSpPr>
-        <p:spPr/>
-        <p:txBody>
-          <a:bodyPr/>
-          <a:lstStyle/>
-          <a:p>
-            <a:endParaRPr lang="en-US"/>
-          </a:p>
-        </p:txBody>
-      </p:sp>
+      <p:pic>
+        <p:nvPicPr>
+          <p:cNvPr id="4" name="Picture 3"/>
+          <p:cNvPicPr>
+            <a:picLocks noChangeAspect="1"/>
+          </p:cNvPicPr>
+          <p:nvPr/>
+        </p:nvPicPr>
+        <p:blipFill>
+          <a:blip r:embed="rId2"/>
+          <a:stretch>
+            <a:fillRect/>
+          </a:stretch>
+        </p:blipFill>
+        <p:spPr>
+          <a:xfrm>
+            <a:off x="0" y="317500"/>
+            <a:ext cx="9144000" cy="6216805"/>
+          </a:xfrm>
+          <a:prstGeom prst="rect">
+            <a:avLst/>
+          </a:prstGeom>
+        </p:spPr>
+      </p:pic>
     </p:spTree>
     <p:extLst>
       <p:ext uri="{BB962C8B-B14F-4D97-AF65-F5344CB8AC3E}">
-        <p14:creationId xmlns:p14="http://schemas.microsoft.com/office/powerpoint/2010/main" val="681389007"/>
+        <p14:creationId xmlns:p14="http://schemas.microsoft.com/office/powerpoint/2010/main" val="3905866210"/>
       </p:ext>
     </p:extLst>
   </p:cSld>
@@ -3276,34 +3263,48 @@
           <a:chExt cx="0" cy="0"/>
         </a:xfrm>
       </p:grpSpPr>
-      <p:pic>
-        <p:nvPicPr>
-          <p:cNvPr id="4" name="Picture 3"/>
-          <p:cNvPicPr>
-            <a:picLocks noChangeAspect="1"/>
-          </p:cNvPicPr>
-          <p:nvPr/>
-        </p:nvPicPr>
-        <p:blipFill>
-          <a:blip r:embed="rId2"/>
-          <a:stretch>
-            <a:fillRect/>
-          </a:stretch>
-        </p:blipFill>
-        <p:spPr>
-          <a:xfrm>
-            <a:off x="789214" y="718457"/>
-            <a:ext cx="6985000" cy="2070100"/>
-          </a:xfrm>
-          <a:prstGeom prst="rect">
-            <a:avLst/>
-          </a:prstGeom>
-        </p:spPr>
-      </p:pic>
+      <p:sp>
+        <p:nvSpPr>
+          <p:cNvPr id="2" name="Title 1"/>
+          <p:cNvSpPr>
+            <a:spLocks noGrp="1"/>
+          </p:cNvSpPr>
+          <p:nvPr>
+            <p:ph type="title"/>
+          </p:nvPr>
+        </p:nvSpPr>
+        <p:spPr/>
+        <p:txBody>
+          <a:bodyPr/>
+          <a:lstStyle/>
+          <a:p>
+            <a:endParaRPr lang="en-US"/>
+          </a:p>
+        </p:txBody>
+      </p:sp>
+      <p:sp>
+        <p:nvSpPr>
+          <p:cNvPr id="3" name="Content Placeholder 2"/>
+          <p:cNvSpPr>
+            <a:spLocks noGrp="1"/>
+          </p:cNvSpPr>
+          <p:nvPr>
+            <p:ph idx="1"/>
+          </p:nvPr>
+        </p:nvSpPr>
+        <p:spPr/>
+        <p:txBody>
+          <a:bodyPr/>
+          <a:lstStyle/>
+          <a:p>
+            <a:endParaRPr lang="en-US"/>
+          </a:p>
+        </p:txBody>
+      </p:sp>
     </p:spTree>
     <p:extLst>
       <p:ext uri="{BB962C8B-B14F-4D97-AF65-F5344CB8AC3E}">
-        <p14:creationId xmlns:p14="http://schemas.microsoft.com/office/powerpoint/2010/main" val="3953743851"/>
+        <p14:creationId xmlns:p14="http://schemas.microsoft.com/office/powerpoint/2010/main" val="681389007"/>
       </p:ext>
     </p:extLst>
   </p:cSld>
@@ -3422,7 +3423,7 @@
               <a:t>h</a:t>
             </a:r>
             <a:r>
-              <a:rPr lang="en-US" smtClean="0"/>
+              <a:rPr lang="en-US" dirty="0" err="1" smtClean="0"/>
               <a:t>yp</a:t>
             </a:r>
             <a:endParaRPr lang="en-US" dirty="0" smtClean="0"/>
@@ -3438,7 +3439,7 @@
             <a:pPr lvl="1"/>
             <a:r>
               <a:rPr lang="en-US" dirty="0" smtClean="0"/>
-              <a:t>Lower genome-wide selective pressure</a:t>
+              <a:t>Lower genome-wide selection coefficient </a:t>
             </a:r>
           </a:p>
         </p:txBody>
@@ -3611,7 +3612,7 @@
           <a:graphicData uri="http://schemas.openxmlformats.org/presentationml/2006/ole">
             <mc:AlternateContent xmlns:mc="http://schemas.openxmlformats.org/markup-compatibility/2006">
               <mc:Choice xmlns:v="urn:schemas-microsoft-com:vml" Requires="v">
-                <p:oleObj spid="_x0000_s1091" name="Equation" r:id="rId3" imgW="114300" imgH="165100" progId="Equation.3">
+                <p:oleObj spid="_x0000_s1093" name="Equation" r:id="rId3" imgW="114300" imgH="165100" progId="Equation.3">
                   <p:embed/>
                 </p:oleObj>
               </mc:Choice>
@@ -3820,7 +3821,7 @@
           <a:graphicData uri="http://schemas.openxmlformats.org/presentationml/2006/ole">
             <mc:AlternateContent xmlns:mc="http://schemas.openxmlformats.org/markup-compatibility/2006">
               <mc:Choice xmlns:v="urn:schemas-microsoft-com:vml" Requires="v">
-                <p:oleObj spid="_x0000_s1092" name="Equation" r:id="rId8" imgW="114300" imgH="165100" progId="Equation.3">
+                <p:oleObj spid="_x0000_s1094" name="Equation" r:id="rId8" imgW="114300" imgH="165100" progId="Equation.3">
                   <p:embed/>
                 </p:oleObj>
               </mc:Choice>
@@ -4174,7 +4175,7 @@
           <a:graphicData uri="http://schemas.openxmlformats.org/presentationml/2006/ole">
             <mc:AlternateContent xmlns:mc="http://schemas.openxmlformats.org/markup-compatibility/2006">
               <mc:Choice xmlns:v="urn:schemas-microsoft-com:vml" Requires="v">
-                <p:oleObj spid="_x0000_s3091" name="Equation" r:id="rId3" imgW="114300" imgH="165100" progId="Equation.3">
+                <p:oleObj spid="_x0000_s3093" name="Equation" r:id="rId3" imgW="114300" imgH="165100" progId="Equation.3">
                   <p:embed/>
                 </p:oleObj>
               </mc:Choice>
@@ -4383,7 +4384,7 @@
           <a:graphicData uri="http://schemas.openxmlformats.org/presentationml/2006/ole">
             <mc:AlternateContent xmlns:mc="http://schemas.openxmlformats.org/markup-compatibility/2006">
               <mc:Choice xmlns:v="urn:schemas-microsoft-com:vml" Requires="v">
-                <p:oleObj spid="_x0000_s3092" name="Equation" r:id="rId8" imgW="114300" imgH="165100" progId="Equation.3">
+                <p:oleObj spid="_x0000_s3094" name="Equation" r:id="rId8" imgW="114300" imgH="165100" progId="Equation.3">
                   <p:embed/>
                 </p:oleObj>
               </mc:Choice>
@@ -4737,7 +4738,7 @@
           <a:graphicData uri="http://schemas.openxmlformats.org/presentationml/2006/ole">
             <mc:AlternateContent xmlns:mc="http://schemas.openxmlformats.org/markup-compatibility/2006">
               <mc:Choice xmlns:v="urn:schemas-microsoft-com:vml" Requires="v">
-                <p:oleObj spid="_x0000_s4115" name="Equation" r:id="rId3" imgW="114300" imgH="165100" progId="Equation.3">
+                <p:oleObj spid="_x0000_s4117" name="Equation" r:id="rId3" imgW="114300" imgH="165100" progId="Equation.3">
                   <p:embed/>
                 </p:oleObj>
               </mc:Choice>
@@ -4946,7 +4947,7 @@
           <a:graphicData uri="http://schemas.openxmlformats.org/presentationml/2006/ole">
             <mc:AlternateContent xmlns:mc="http://schemas.openxmlformats.org/markup-compatibility/2006">
               <mc:Choice xmlns:v="urn:schemas-microsoft-com:vml" Requires="v">
-                <p:oleObj spid="_x0000_s4116" name="Equation" r:id="rId8" imgW="114300" imgH="165100" progId="Equation.3">
+                <p:oleObj spid="_x0000_s4118" name="Equation" r:id="rId8" imgW="114300" imgH="165100" progId="Equation.3">
                   <p:embed/>
                 </p:oleObj>
               </mc:Choice>
@@ -5179,7 +5180,7 @@
           <a:p>
             <a:r>
               <a:rPr lang="en-US" dirty="0" smtClean="0"/>
-              <a:t>Seed-bank WF model</a:t>
+              <a:t>Break the model</a:t>
             </a:r>
             <a:endParaRPr lang="en-US" dirty="0"/>
           </a:p>
@@ -5207,7 +5208,7 @@
     </p:spTree>
     <p:extLst>
       <p:ext uri="{BB962C8B-B14F-4D97-AF65-F5344CB8AC3E}">
-        <p14:creationId xmlns:p14="http://schemas.microsoft.com/office/powerpoint/2010/main" val="2564548159"/>
+        <p14:creationId xmlns:p14="http://schemas.microsoft.com/office/powerpoint/2010/main" val="2875823600"/>
       </p:ext>
     </p:extLst>
   </p:cSld>
@@ -5234,172 +5235,52 @@
           <a:chExt cx="0" cy="0"/>
         </a:xfrm>
       </p:grpSpPr>
-      <p:pic>
-        <p:nvPicPr>
-          <p:cNvPr id="4" name="Picture 3"/>
-          <p:cNvPicPr>
-            <a:picLocks noChangeAspect="1"/>
-          </p:cNvPicPr>
-          <p:nvPr/>
-        </p:nvPicPr>
-        <p:blipFill>
-          <a:blip r:embed="rId2"/>
-          <a:stretch>
-            <a:fillRect/>
-          </a:stretch>
-        </p:blipFill>
-        <p:spPr>
-          <a:xfrm>
-            <a:off x="671285" y="2802167"/>
-            <a:ext cx="7311572" cy="3498992"/>
-          </a:xfrm>
-          <a:prstGeom prst="rect">
-            <a:avLst/>
-          </a:prstGeom>
-        </p:spPr>
-      </p:pic>
-      <p:sp>
-        <p:nvSpPr>
-          <p:cNvPr id="5" name="TextBox 4"/>
-          <p:cNvSpPr txBox="1"/>
-          <p:nvPr/>
-        </p:nvSpPr>
-        <p:spPr>
-          <a:xfrm>
-            <a:off x="580573" y="686584"/>
-            <a:ext cx="4227285" cy="954107"/>
-          </a:xfrm>
-          <a:prstGeom prst="rect">
-            <a:avLst/>
-          </a:prstGeom>
-          <a:noFill/>
-        </p:spPr>
-        <p:txBody>
-          <a:bodyPr wrap="square" rtlCol="0">
-            <a:spAutoFit/>
-          </a:bodyPr>
-          <a:lstStyle/>
-          <a:p>
-            <a:r>
-              <a:rPr lang="en-US" sz="2800" b="1" dirty="0" smtClean="0"/>
-              <a:t>Resampled each</a:t>
-            </a:r>
-          </a:p>
-          <a:p>
-            <a:r>
-              <a:rPr lang="en-US" sz="2800" b="1" dirty="0" smtClean="0"/>
-              <a:t> time unit </a:t>
-            </a:r>
-            <a:endParaRPr lang="en-US" sz="2800" b="1" dirty="0"/>
-          </a:p>
-        </p:txBody>
-      </p:sp>
-      <p:sp>
-        <p:nvSpPr>
-          <p:cNvPr id="6" name="TextBox 5"/>
-          <p:cNvSpPr txBox="1"/>
-          <p:nvPr/>
-        </p:nvSpPr>
-        <p:spPr>
-          <a:xfrm>
-            <a:off x="4916715" y="1064530"/>
-            <a:ext cx="3272972" cy="523220"/>
-          </a:xfrm>
-          <a:prstGeom prst="rect">
-            <a:avLst/>
-          </a:prstGeom>
-          <a:noFill/>
-        </p:spPr>
-        <p:txBody>
-          <a:bodyPr wrap="square" rtlCol="0">
-            <a:spAutoFit/>
-          </a:bodyPr>
-          <a:lstStyle/>
-          <a:p>
-            <a:r>
-              <a:rPr lang="en-US" sz="2800" b="1" dirty="0" smtClean="0"/>
-              <a:t>No resampling</a:t>
-            </a:r>
-            <a:endParaRPr lang="en-US" sz="2800" b="1" dirty="0"/>
-          </a:p>
-        </p:txBody>
-      </p:sp>
-      <p:cxnSp>
-        <p:nvCxnSpPr>
-          <p:cNvPr id="7" name="Straight Arrow Connector 6"/>
-          <p:cNvCxnSpPr/>
-          <p:nvPr/>
-        </p:nvCxnSpPr>
-        <p:spPr>
-          <a:xfrm flipH="1">
-            <a:off x="1894114" y="1740200"/>
-            <a:ext cx="1" cy="1090085"/>
-          </a:xfrm>
-          <a:prstGeom prst="straightConnector1">
-            <a:avLst/>
-          </a:prstGeom>
-          <a:ln>
-            <a:solidFill>
-              <a:schemeClr val="tx1"/>
-            </a:solidFill>
-            <a:tailEnd type="triangle" w="lg" len="lg"/>
-          </a:ln>
-        </p:spPr>
-        <p:style>
-          <a:lnRef idx="2">
-            <a:schemeClr val="accent1"/>
-          </a:lnRef>
-          <a:fillRef idx="0">
-            <a:schemeClr val="accent1"/>
-          </a:fillRef>
-          <a:effectRef idx="1">
-            <a:schemeClr val="accent1"/>
-          </a:effectRef>
-          <a:fontRef idx="minor">
-            <a:schemeClr val="tx1"/>
-          </a:fontRef>
-        </p:style>
-      </p:cxnSp>
-      <p:cxnSp>
-        <p:nvCxnSpPr>
-          <p:cNvPr id="10" name="Straight Arrow Connector 9"/>
-          <p:cNvCxnSpPr/>
-          <p:nvPr/>
-        </p:nvCxnSpPr>
-        <p:spPr>
-          <a:xfrm flipH="1">
-            <a:off x="6926943" y="1892600"/>
-            <a:ext cx="1" cy="1090085"/>
-          </a:xfrm>
-          <a:prstGeom prst="straightConnector1">
-            <a:avLst/>
-          </a:prstGeom>
-          <a:ln>
-            <a:solidFill>
-              <a:schemeClr val="tx1"/>
-            </a:solidFill>
-            <a:tailEnd type="triangle" w="lg" len="lg"/>
-          </a:ln>
-        </p:spPr>
-        <p:style>
-          <a:lnRef idx="2">
-            <a:schemeClr val="accent1"/>
-          </a:lnRef>
-          <a:fillRef idx="0">
-            <a:schemeClr val="accent1"/>
-          </a:fillRef>
-          <a:effectRef idx="1">
-            <a:schemeClr val="accent1"/>
-          </a:effectRef>
-          <a:fontRef idx="minor">
-            <a:schemeClr val="tx1"/>
-          </a:fontRef>
-        </p:style>
-      </p:cxnSp>
+      <p:sp>
+        <p:nvSpPr>
+          <p:cNvPr id="2" name="Title 1"/>
+          <p:cNvSpPr>
+            <a:spLocks noGrp="1"/>
+          </p:cNvSpPr>
+          <p:nvPr>
+            <p:ph type="title"/>
+          </p:nvPr>
+        </p:nvSpPr>
+        <p:spPr/>
+        <p:txBody>
+          <a:bodyPr/>
+          <a:lstStyle/>
+          <a:p>
+            <a:r>
+              <a:rPr lang="en-US" dirty="0" smtClean="0"/>
+              <a:t>Seed-bank WF model</a:t>
+            </a:r>
+            <a:endParaRPr lang="en-US" dirty="0"/>
+          </a:p>
+        </p:txBody>
+      </p:sp>
+      <p:sp>
+        <p:nvSpPr>
+          <p:cNvPr id="3" name="Content Placeholder 2"/>
+          <p:cNvSpPr>
+            <a:spLocks noGrp="1"/>
+          </p:cNvSpPr>
+          <p:nvPr>
+            <p:ph idx="1"/>
+          </p:nvPr>
+        </p:nvSpPr>
+        <p:spPr/>
+        <p:txBody>
+          <a:bodyPr/>
+          <a:lstStyle/>
+          <a:p>
+            <a:endParaRPr lang="en-US"/>
+          </a:p>
+        </p:txBody>
+      </p:sp>
     </p:spTree>
     <p:extLst>
       <p:ext uri="{BB962C8B-B14F-4D97-AF65-F5344CB8AC3E}">
-        <p14:creationId xmlns:p14="http://schemas.microsoft.com/office/powerpoint/2010/main" val="3076653689"/>
+        <p14:creationId xmlns:p14="http://schemas.microsoft.com/office/powerpoint/2010/main" val="2564548159"/>
       </p:ext>
     </p:extLst>
   </p:cSld>
@@ -5441,43 +5322,157 @@
           </a:stretch>
         </p:blipFill>
         <p:spPr>
-          <a:xfrm rot="16200000">
-            <a:off x="4786502" y="20944850"/>
-            <a:ext cx="5615031" cy="10267594"/>
+          <a:xfrm>
+            <a:off x="671285" y="2802167"/>
+            <a:ext cx="7311572" cy="3498992"/>
           </a:xfrm>
           <a:prstGeom prst="rect">
             <a:avLst/>
           </a:prstGeom>
         </p:spPr>
       </p:pic>
-      <p:pic>
-        <p:nvPicPr>
-          <p:cNvPr id="5" name="Picture 4"/>
-          <p:cNvPicPr>
-            <a:picLocks noChangeAspect="1"/>
-          </p:cNvPicPr>
+      <p:sp>
+        <p:nvSpPr>
+          <p:cNvPr id="5" name="TextBox 4"/>
+          <p:cNvSpPr txBox="1"/>
           <p:nvPr/>
-        </p:nvPicPr>
-        <p:blipFill>
-          <a:blip r:embed="rId3"/>
-          <a:stretch>
-            <a:fillRect/>
-          </a:stretch>
-        </p:blipFill>
-        <p:spPr>
-          <a:xfrm>
-            <a:off x="1" y="927100"/>
-            <a:ext cx="6233238" cy="3409043"/>
+        </p:nvSpPr>
+        <p:spPr>
+          <a:xfrm>
+            <a:off x="580573" y="686584"/>
+            <a:ext cx="4227285" cy="954107"/>
           </a:xfrm>
           <a:prstGeom prst="rect">
             <a:avLst/>
           </a:prstGeom>
-        </p:spPr>
-      </p:pic>
+          <a:noFill/>
+        </p:spPr>
+        <p:txBody>
+          <a:bodyPr wrap="square" rtlCol="0">
+            <a:spAutoFit/>
+          </a:bodyPr>
+          <a:lstStyle/>
+          <a:p>
+            <a:r>
+              <a:rPr lang="en-US" sz="2800" b="1" dirty="0" smtClean="0"/>
+              <a:t>Resampled each</a:t>
+            </a:r>
+          </a:p>
+          <a:p>
+            <a:r>
+              <a:rPr lang="en-US" sz="2800" b="1" dirty="0" smtClean="0"/>
+              <a:t> time unit </a:t>
+            </a:r>
+            <a:endParaRPr lang="en-US" sz="2800" b="1" dirty="0"/>
+          </a:p>
+        </p:txBody>
+      </p:sp>
+      <p:sp>
+        <p:nvSpPr>
+          <p:cNvPr id="6" name="TextBox 5"/>
+          <p:cNvSpPr txBox="1"/>
+          <p:nvPr/>
+        </p:nvSpPr>
+        <p:spPr>
+          <a:xfrm>
+            <a:off x="4916715" y="1064530"/>
+            <a:ext cx="3272972" cy="523220"/>
+          </a:xfrm>
+          <a:prstGeom prst="rect">
+            <a:avLst/>
+          </a:prstGeom>
+          <a:noFill/>
+        </p:spPr>
+        <p:txBody>
+          <a:bodyPr wrap="square" rtlCol="0">
+            <a:spAutoFit/>
+          </a:bodyPr>
+          <a:lstStyle/>
+          <a:p>
+            <a:r>
+              <a:rPr lang="en-US" sz="2800" b="1" dirty="0" smtClean="0"/>
+              <a:t>No resampling</a:t>
+            </a:r>
+            <a:endParaRPr lang="en-US" sz="2800" b="1" dirty="0"/>
+          </a:p>
+        </p:txBody>
+      </p:sp>
+      <p:cxnSp>
+        <p:nvCxnSpPr>
+          <p:cNvPr id="7" name="Straight Arrow Connector 6"/>
+          <p:cNvCxnSpPr/>
+          <p:nvPr/>
+        </p:nvCxnSpPr>
+        <p:spPr>
+          <a:xfrm flipH="1">
+            <a:off x="1894114" y="1740200"/>
+            <a:ext cx="1" cy="1090085"/>
+          </a:xfrm>
+          <a:prstGeom prst="straightConnector1">
+            <a:avLst/>
+          </a:prstGeom>
+          <a:ln>
+            <a:solidFill>
+              <a:schemeClr val="tx1"/>
+            </a:solidFill>
+            <a:tailEnd type="triangle" w="lg" len="lg"/>
+          </a:ln>
+        </p:spPr>
+        <p:style>
+          <a:lnRef idx="2">
+            <a:schemeClr val="accent1"/>
+          </a:lnRef>
+          <a:fillRef idx="0">
+            <a:schemeClr val="accent1"/>
+          </a:fillRef>
+          <a:effectRef idx="1">
+            <a:schemeClr val="accent1"/>
+          </a:effectRef>
+          <a:fontRef idx="minor">
+            <a:schemeClr val="tx1"/>
+          </a:fontRef>
+        </p:style>
+      </p:cxnSp>
+      <p:cxnSp>
+        <p:nvCxnSpPr>
+          <p:cNvPr id="10" name="Straight Arrow Connector 9"/>
+          <p:cNvCxnSpPr/>
+          <p:nvPr/>
+        </p:nvCxnSpPr>
+        <p:spPr>
+          <a:xfrm flipH="1">
+            <a:off x="6926943" y="1892600"/>
+            <a:ext cx="1" cy="1090085"/>
+          </a:xfrm>
+          <a:prstGeom prst="straightConnector1">
+            <a:avLst/>
+          </a:prstGeom>
+          <a:ln>
+            <a:solidFill>
+              <a:schemeClr val="tx1"/>
+            </a:solidFill>
+            <a:tailEnd type="triangle" w="lg" len="lg"/>
+          </a:ln>
+        </p:spPr>
+        <p:style>
+          <a:lnRef idx="2">
+            <a:schemeClr val="accent1"/>
+          </a:lnRef>
+          <a:fillRef idx="0">
+            <a:schemeClr val="accent1"/>
+          </a:fillRef>
+          <a:effectRef idx="1">
+            <a:schemeClr val="accent1"/>
+          </a:effectRef>
+          <a:fontRef idx="minor">
+            <a:schemeClr val="tx1"/>
+          </a:fontRef>
+        </p:style>
+      </p:cxnSp>
     </p:spTree>
     <p:extLst>
       <p:ext uri="{BB962C8B-B14F-4D97-AF65-F5344CB8AC3E}">
-        <p14:creationId xmlns:p14="http://schemas.microsoft.com/office/powerpoint/2010/main" val="1211720957"/>
+        <p14:creationId xmlns:p14="http://schemas.microsoft.com/office/powerpoint/2010/main" val="3076653689"/>
       </p:ext>
     </p:extLst>
   </p:cSld>
@@ -5504,52 +5499,58 @@
           <a:chExt cx="0" cy="0"/>
         </a:xfrm>
       </p:grpSpPr>
-      <p:sp>
-        <p:nvSpPr>
-          <p:cNvPr id="2" name="Title 1"/>
-          <p:cNvSpPr>
-            <a:spLocks noGrp="1"/>
-          </p:cNvSpPr>
-          <p:nvPr>
-            <p:ph type="title"/>
-          </p:nvPr>
-        </p:nvSpPr>
-        <p:spPr/>
-        <p:txBody>
-          <a:bodyPr/>
-          <a:lstStyle/>
-          <a:p>
-            <a:r>
-              <a:rPr lang="en-US" dirty="0" smtClean="0"/>
-              <a:t>What would the SFS look like?</a:t>
-            </a:r>
-            <a:endParaRPr lang="en-US" dirty="0"/>
-          </a:p>
-        </p:txBody>
-      </p:sp>
-      <p:sp>
-        <p:nvSpPr>
-          <p:cNvPr id="3" name="Content Placeholder 2"/>
-          <p:cNvSpPr>
-            <a:spLocks noGrp="1"/>
-          </p:cNvSpPr>
-          <p:nvPr>
-            <p:ph idx="1"/>
-          </p:nvPr>
-        </p:nvSpPr>
-        <p:spPr/>
-        <p:txBody>
-          <a:bodyPr/>
-          <a:lstStyle/>
-          <a:p>
-            <a:endParaRPr lang="en-US"/>
-          </a:p>
-        </p:txBody>
-      </p:sp>
+      <p:pic>
+        <p:nvPicPr>
+          <p:cNvPr id="4" name="Picture 3"/>
+          <p:cNvPicPr>
+            <a:picLocks noChangeAspect="1"/>
+          </p:cNvPicPr>
+          <p:nvPr/>
+        </p:nvPicPr>
+        <p:blipFill>
+          <a:blip r:embed="rId2"/>
+          <a:stretch>
+            <a:fillRect/>
+          </a:stretch>
+        </p:blipFill>
+        <p:spPr>
+          <a:xfrm rot="16200000">
+            <a:off x="4786502" y="20944850"/>
+            <a:ext cx="5615031" cy="10267594"/>
+          </a:xfrm>
+          <a:prstGeom prst="rect">
+            <a:avLst/>
+          </a:prstGeom>
+        </p:spPr>
+      </p:pic>
+      <p:pic>
+        <p:nvPicPr>
+          <p:cNvPr id="5" name="Picture 4"/>
+          <p:cNvPicPr>
+            <a:picLocks noChangeAspect="1"/>
+          </p:cNvPicPr>
+          <p:nvPr/>
+        </p:nvPicPr>
+        <p:blipFill>
+          <a:blip r:embed="rId3"/>
+          <a:stretch>
+            <a:fillRect/>
+          </a:stretch>
+        </p:blipFill>
+        <p:spPr>
+          <a:xfrm>
+            <a:off x="1" y="927100"/>
+            <a:ext cx="6233238" cy="3409043"/>
+          </a:xfrm>
+          <a:prstGeom prst="rect">
+            <a:avLst/>
+          </a:prstGeom>
+        </p:spPr>
+      </p:pic>
     </p:spTree>
     <p:extLst>
       <p:ext uri="{BB962C8B-B14F-4D97-AF65-F5344CB8AC3E}">
-        <p14:creationId xmlns:p14="http://schemas.microsoft.com/office/powerpoint/2010/main" val="3127240658"/>
+        <p14:creationId xmlns:p14="http://schemas.microsoft.com/office/powerpoint/2010/main" val="1211720957"/>
       </p:ext>
     </p:extLst>
   </p:cSld>
@@ -5705,67 +5706,24 @@
           <a:chExt cx="0" cy="0"/>
         </a:xfrm>
       </p:grpSpPr>
-      <p:pic>
-        <p:nvPicPr>
-          <p:cNvPr id="5" name="Picture 4"/>
-          <p:cNvPicPr>
-            <a:picLocks noChangeAspect="1"/>
-          </p:cNvPicPr>
-          <p:nvPr/>
-        </p:nvPicPr>
-        <p:blipFill>
-          <a:blip r:embed="rId2"/>
-          <a:stretch>
-            <a:fillRect/>
-          </a:stretch>
-        </p:blipFill>
-        <p:spPr>
-          <a:xfrm>
-            <a:off x="0" y="1803400"/>
-            <a:ext cx="9144000" cy="3235377"/>
-          </a:xfrm>
-          <a:prstGeom prst="rect">
-            <a:avLst/>
-          </a:prstGeom>
-        </p:spPr>
-      </p:pic>
-      <p:sp>
-        <p:nvSpPr>
-          <p:cNvPr id="6" name="TextBox 5"/>
-          <p:cNvSpPr txBox="1"/>
-          <p:nvPr/>
-        </p:nvSpPr>
-        <p:spPr>
-          <a:xfrm>
-            <a:off x="308427" y="5515429"/>
-            <a:ext cx="3066143" cy="369332"/>
-          </a:xfrm>
-          <a:prstGeom prst="rect">
-            <a:avLst/>
-          </a:prstGeom>
-          <a:noFill/>
-        </p:spPr>
-        <p:txBody>
-          <a:bodyPr wrap="square" rtlCol="0">
-            <a:spAutoFit/>
-          </a:bodyPr>
-          <a:lstStyle/>
-          <a:p>
-            <a:r>
-              <a:rPr lang="en-US" dirty="0" err="1" smtClean="0"/>
-              <a:t>Barrick</a:t>
-            </a:r>
+      <p:sp>
+        <p:nvSpPr>
+          <p:cNvPr id="2" name="Title 1"/>
+          <p:cNvSpPr>
+            <a:spLocks noGrp="1"/>
+          </p:cNvSpPr>
+          <p:nvPr>
+            <p:ph type="title"/>
+          </p:nvPr>
+        </p:nvSpPr>
+        <p:spPr/>
+        <p:txBody>
+          <a:bodyPr/>
+          <a:lstStyle/>
+          <a:p>
             <a:r>
               <a:rPr lang="en-US" dirty="0" smtClean="0"/>
-              <a:t> &amp; </a:t>
-            </a:r>
-            <a:r>
-              <a:rPr lang="en-US" dirty="0" err="1" smtClean="0"/>
-              <a:t>Lenski</a:t>
-            </a:r>
-            <a:r>
-              <a:rPr lang="en-US" dirty="0" smtClean="0"/>
-              <a:t>, 2013</a:t>
+              <a:t>What would the SFS look like?</a:t>
             </a:r>
             <a:endParaRPr lang="en-US" dirty="0"/>
           </a:p>
@@ -5773,46 +5731,27 @@
       </p:sp>
       <p:sp>
         <p:nvSpPr>
-          <p:cNvPr id="7" name="TextBox 6"/>
-          <p:cNvSpPr txBox="1"/>
-          <p:nvPr/>
-        </p:nvSpPr>
-        <p:spPr>
-          <a:xfrm>
-            <a:off x="508000" y="344714"/>
-            <a:ext cx="7003143" cy="523220"/>
-          </a:xfrm>
-          <a:prstGeom prst="rect">
-            <a:avLst/>
-          </a:prstGeom>
-          <a:noFill/>
-        </p:spPr>
-        <p:txBody>
-          <a:bodyPr wrap="square" rtlCol="0">
-            <a:spAutoFit/>
-          </a:bodyPr>
-          <a:lstStyle/>
-          <a:p>
-            <a:r>
-              <a:rPr lang="en-US" sz="2800" b="1" dirty="0" smtClean="0"/>
-              <a:t>Mutation rate </a:t>
-            </a:r>
-            <a:r>
-              <a:rPr lang="en-US" sz="2800" b="1" dirty="0" err="1" smtClean="0"/>
-              <a:t>vs</a:t>
-            </a:r>
-            <a:r>
-              <a:rPr lang="en-US" sz="2800" b="1" dirty="0" smtClean="0"/>
-              <a:t> substitution rate</a:t>
-            </a:r>
-            <a:endParaRPr lang="en-US" sz="2800" b="1" dirty="0"/>
+          <p:cNvPr id="3" name="Content Placeholder 2"/>
+          <p:cNvSpPr>
+            <a:spLocks noGrp="1"/>
+          </p:cNvSpPr>
+          <p:nvPr>
+            <p:ph idx="1"/>
+          </p:nvPr>
+        </p:nvSpPr>
+        <p:spPr/>
+        <p:txBody>
+          <a:bodyPr/>
+          <a:lstStyle/>
+          <a:p>
+            <a:endParaRPr lang="en-US"/>
           </a:p>
         </p:txBody>
       </p:sp>
     </p:spTree>
     <p:extLst>
       <p:ext uri="{BB962C8B-B14F-4D97-AF65-F5344CB8AC3E}">
-        <p14:creationId xmlns:p14="http://schemas.microsoft.com/office/powerpoint/2010/main" val="193663016"/>
+        <p14:creationId xmlns:p14="http://schemas.microsoft.com/office/powerpoint/2010/main" val="3127240658"/>
       </p:ext>
     </p:extLst>
   </p:cSld>
@@ -5839,6 +5778,140 @@
           <a:chExt cx="0" cy="0"/>
         </a:xfrm>
       </p:grpSpPr>
+      <p:pic>
+        <p:nvPicPr>
+          <p:cNvPr id="5" name="Picture 4"/>
+          <p:cNvPicPr>
+            <a:picLocks noChangeAspect="1"/>
+          </p:cNvPicPr>
+          <p:nvPr/>
+        </p:nvPicPr>
+        <p:blipFill>
+          <a:blip r:embed="rId2"/>
+          <a:stretch>
+            <a:fillRect/>
+          </a:stretch>
+        </p:blipFill>
+        <p:spPr>
+          <a:xfrm>
+            <a:off x="0" y="1803400"/>
+            <a:ext cx="9144000" cy="3235377"/>
+          </a:xfrm>
+          <a:prstGeom prst="rect">
+            <a:avLst/>
+          </a:prstGeom>
+        </p:spPr>
+      </p:pic>
+      <p:sp>
+        <p:nvSpPr>
+          <p:cNvPr id="6" name="TextBox 5"/>
+          <p:cNvSpPr txBox="1"/>
+          <p:nvPr/>
+        </p:nvSpPr>
+        <p:spPr>
+          <a:xfrm>
+            <a:off x="308427" y="5515429"/>
+            <a:ext cx="3066143" cy="369332"/>
+          </a:xfrm>
+          <a:prstGeom prst="rect">
+            <a:avLst/>
+          </a:prstGeom>
+          <a:noFill/>
+        </p:spPr>
+        <p:txBody>
+          <a:bodyPr wrap="square" rtlCol="0">
+            <a:spAutoFit/>
+          </a:bodyPr>
+          <a:lstStyle/>
+          <a:p>
+            <a:r>
+              <a:rPr lang="en-US" dirty="0" err="1" smtClean="0"/>
+              <a:t>Barrick</a:t>
+            </a:r>
+            <a:r>
+              <a:rPr lang="en-US" dirty="0" smtClean="0"/>
+              <a:t> &amp; </a:t>
+            </a:r>
+            <a:r>
+              <a:rPr lang="en-US" dirty="0" err="1" smtClean="0"/>
+              <a:t>Lenski</a:t>
+            </a:r>
+            <a:r>
+              <a:rPr lang="en-US" dirty="0" smtClean="0"/>
+              <a:t>, 2013</a:t>
+            </a:r>
+            <a:endParaRPr lang="en-US" dirty="0"/>
+          </a:p>
+        </p:txBody>
+      </p:sp>
+      <p:sp>
+        <p:nvSpPr>
+          <p:cNvPr id="7" name="TextBox 6"/>
+          <p:cNvSpPr txBox="1"/>
+          <p:nvPr/>
+        </p:nvSpPr>
+        <p:spPr>
+          <a:xfrm>
+            <a:off x="508000" y="344714"/>
+            <a:ext cx="7003143" cy="523220"/>
+          </a:xfrm>
+          <a:prstGeom prst="rect">
+            <a:avLst/>
+          </a:prstGeom>
+          <a:noFill/>
+        </p:spPr>
+        <p:txBody>
+          <a:bodyPr wrap="square" rtlCol="0">
+            <a:spAutoFit/>
+          </a:bodyPr>
+          <a:lstStyle/>
+          <a:p>
+            <a:r>
+              <a:rPr lang="en-US" sz="2800" b="1" dirty="0" smtClean="0"/>
+              <a:t>Mutation rate </a:t>
+            </a:r>
+            <a:r>
+              <a:rPr lang="en-US" sz="2800" b="1" dirty="0" err="1" smtClean="0"/>
+              <a:t>vs</a:t>
+            </a:r>
+            <a:r>
+              <a:rPr lang="en-US" sz="2800" b="1" dirty="0" smtClean="0"/>
+              <a:t> substitution rate</a:t>
+            </a:r>
+            <a:endParaRPr lang="en-US" sz="2800" b="1" dirty="0"/>
+          </a:p>
+        </p:txBody>
+      </p:sp>
+    </p:spTree>
+    <p:extLst>
+      <p:ext uri="{BB962C8B-B14F-4D97-AF65-F5344CB8AC3E}">
+        <p14:creationId xmlns:p14="http://schemas.microsoft.com/office/powerpoint/2010/main" val="193663016"/>
+      </p:ext>
+    </p:extLst>
+  </p:cSld>
+  <p:clrMapOvr>
+    <a:masterClrMapping/>
+  </p:clrMapOvr>
+</p:sld>
+</file>
+
+<file path=ppt/slides/slide22.xml><?xml version="1.0" encoding="utf-8"?>
+<p:sld xmlns:a="http://schemas.openxmlformats.org/drawingml/2006/main" xmlns:r="http://schemas.openxmlformats.org/officeDocument/2006/relationships" xmlns:p="http://schemas.openxmlformats.org/presentationml/2006/main">
+  <p:cSld>
+    <p:spTree>
+      <p:nvGrpSpPr>
+        <p:cNvPr id="1" name=""/>
+        <p:cNvGrpSpPr/>
+        <p:nvPr/>
+      </p:nvGrpSpPr>
+      <p:grpSpPr>
+        <a:xfrm>
+          <a:off x="0" y="0"/>
+          <a:ext cx="0" cy="0"/>
+          <a:chOff x="0" y="0"/>
+          <a:chExt cx="0" cy="0"/>
+        </a:xfrm>
+      </p:grpSpPr>
       <p:sp>
         <p:nvSpPr>
           <p:cNvPr id="2" name="Title 1"/>
@@ -5875,7 +5948,7 @@
 </p:sld>
 </file>
 
-<file path=ppt/slides/slide22.xml><?xml version="1.0" encoding="utf-8"?>
+<file path=ppt/slides/slide23.xml><?xml version="1.0" encoding="utf-8"?>
 <p:sld xmlns:a="http://schemas.openxmlformats.org/drawingml/2006/main" xmlns:r="http://schemas.openxmlformats.org/officeDocument/2006/relationships" xmlns:p="http://schemas.openxmlformats.org/presentationml/2006/main">
   <p:cSld>
     <p:spTree>
@@ -6175,159 +6248,6 @@
 </p:sld>
 </file>
 
-<file path=ppt/slides/slide23.xml><?xml version="1.0" encoding="utf-8"?>
-<p:sld xmlns:a="http://schemas.openxmlformats.org/drawingml/2006/main" xmlns:r="http://schemas.openxmlformats.org/officeDocument/2006/relationships" xmlns:p="http://schemas.openxmlformats.org/presentationml/2006/main">
-  <p:cSld>
-    <p:spTree>
-      <p:nvGrpSpPr>
-        <p:cNvPr id="1" name=""/>
-        <p:cNvGrpSpPr/>
-        <p:nvPr/>
-      </p:nvGrpSpPr>
-      <p:grpSpPr>
-        <a:xfrm>
-          <a:off x="0" y="0"/>
-          <a:ext cx="0" cy="0"/>
-          <a:chOff x="0" y="0"/>
-          <a:chExt cx="0" cy="0"/>
-        </a:xfrm>
-      </p:grpSpPr>
-      <p:sp>
-        <p:nvSpPr>
-          <p:cNvPr id="2" name="Title 1"/>
-          <p:cNvSpPr>
-            <a:spLocks noGrp="1"/>
-          </p:cNvSpPr>
-          <p:nvPr>
-            <p:ph type="title"/>
-          </p:nvPr>
-        </p:nvSpPr>
-        <p:spPr/>
-        <p:txBody>
-          <a:bodyPr>
-            <a:normAutofit fontScale="90000"/>
-          </a:bodyPr>
-          <a:lstStyle/>
-          <a:p>
-            <a:r>
-              <a:rPr lang="en-US" dirty="0" smtClean="0"/>
-              <a:t>Issues with standard culture techniques</a:t>
-            </a:r>
-            <a:endParaRPr lang="en-US" dirty="0"/>
-          </a:p>
-        </p:txBody>
-      </p:sp>
-      <p:sp>
-        <p:nvSpPr>
-          <p:cNvPr id="3" name="Content Placeholder 2"/>
-          <p:cNvSpPr>
-            <a:spLocks noGrp="1"/>
-          </p:cNvSpPr>
-          <p:nvPr>
-            <p:ph idx="1"/>
-          </p:nvPr>
-        </p:nvSpPr>
-        <p:spPr>
-          <a:xfrm>
-            <a:off x="457200" y="1600200"/>
-            <a:ext cx="8229600" cy="4931229"/>
-          </a:xfrm>
-        </p:spPr>
-        <p:txBody>
-          <a:bodyPr>
-            <a:normAutofit lnSpcReduction="10000"/>
-          </a:bodyPr>
-          <a:lstStyle/>
-          <a:p>
-            <a:r>
-              <a:rPr lang="en-US" dirty="0" smtClean="0"/>
-              <a:t>Nutrient replenishment = boom-bust cycles</a:t>
-            </a:r>
-          </a:p>
-          <a:p>
-            <a:pPr lvl="1"/>
-            <a:r>
-              <a:rPr lang="en-US" dirty="0" smtClean="0"/>
-              <a:t>Different rates of resuscitation/ dormancy (i.e. migration) during  growth kinetics</a:t>
-            </a:r>
-          </a:p>
-          <a:p>
-            <a:pPr lvl="1"/>
-            <a:r>
-              <a:rPr lang="en-US" dirty="0" smtClean="0"/>
-              <a:t>Different selective pressures</a:t>
-            </a:r>
-          </a:p>
-          <a:p>
-            <a:r>
-              <a:rPr lang="en-US" dirty="0" smtClean="0"/>
-              <a:t>Have to track both population </a:t>
-            </a:r>
-            <a:r>
-              <a:rPr lang="en-US" b="1" dirty="0" smtClean="0"/>
-              <a:t>size</a:t>
-            </a:r>
-            <a:r>
-              <a:rPr lang="en-US" dirty="0" smtClean="0"/>
-              <a:t> and migration </a:t>
-            </a:r>
-            <a:r>
-              <a:rPr lang="en-US" b="1" dirty="0" smtClean="0"/>
-              <a:t>rate</a:t>
-            </a:r>
-          </a:p>
-          <a:p>
-            <a:r>
-              <a:rPr lang="en-US" dirty="0" smtClean="0"/>
-              <a:t>Risk of loosing low-frequency alleles during transfer </a:t>
-            </a:r>
-            <a:r>
-              <a:rPr lang="en-US" dirty="0"/>
-              <a:t>b</a:t>
-            </a:r>
-            <a:r>
-              <a:rPr lang="en-US" dirty="0" smtClean="0"/>
-              <a:t>ottlenecking </a:t>
-            </a:r>
-            <a:endParaRPr lang="en-US" dirty="0" smtClean="0"/>
-          </a:p>
-          <a:p>
-            <a:pPr lvl="1"/>
-            <a:r>
-              <a:rPr lang="en-US" dirty="0" smtClean="0"/>
-              <a:t>Not a theoretical issue (neutral evolution)</a:t>
-            </a:r>
-          </a:p>
-          <a:p>
-            <a:pPr lvl="1"/>
-            <a:r>
-              <a:rPr lang="en-US" dirty="0" smtClean="0"/>
-              <a:t>Issue with detecting low freq. alleles with low </a:t>
-            </a:r>
-            <a:r>
-              <a:rPr lang="el-GR" dirty="0" smtClean="0"/>
-              <a:t>μ</a:t>
-            </a:r>
-            <a:r>
-              <a:rPr lang="en-US" dirty="0" smtClean="0"/>
-              <a:t> </a:t>
-            </a:r>
-          </a:p>
-        </p:txBody>
-      </p:sp>
-    </p:spTree>
-    <p:extLst>
-      <p:ext uri="{BB962C8B-B14F-4D97-AF65-F5344CB8AC3E}">
-        <p14:creationId xmlns:p14="http://schemas.microsoft.com/office/powerpoint/2010/main" val="1919697148"/>
-      </p:ext>
-    </p:extLst>
-  </p:cSld>
-  <p:clrMapOvr>
-    <a:masterClrMapping/>
-  </p:clrMapOvr>
-</p:sld>
-</file>
-
 <file path=ppt/slides/slide24.xml><?xml version="1.0" encoding="utf-8"?>
 <p:sld xmlns:a="http://schemas.openxmlformats.org/drawingml/2006/main" xmlns:r="http://schemas.openxmlformats.org/officeDocument/2006/relationships" xmlns:p="http://schemas.openxmlformats.org/presentationml/2006/main">
   <p:cSld>
@@ -6357,16 +6277,14 @@
         </p:nvSpPr>
         <p:spPr/>
         <p:txBody>
-          <a:bodyPr/>
-          <a:lstStyle/>
-          <a:p>
-            <a:r>
-              <a:rPr lang="en-US" dirty="0" err="1" smtClean="0"/>
-              <a:t>Chemostats</a:t>
-            </a:r>
+          <a:bodyPr>
+            <a:normAutofit fontScale="90000"/>
+          </a:bodyPr>
+          <a:lstStyle/>
+          <a:p>
             <a:r>
               <a:rPr lang="en-US" dirty="0" smtClean="0"/>
-              <a:t> as a solution</a:t>
+              <a:t>Issues with standard culture techniques</a:t>
             </a:r>
             <a:endParaRPr lang="en-US" dirty="0"/>
           </a:p>
@@ -6382,19 +6300,98 @@
             <p:ph idx="1"/>
           </p:nvPr>
         </p:nvSpPr>
-        <p:spPr/>
-        <p:txBody>
-          <a:bodyPr/>
-          <a:lstStyle/>
-          <a:p>
-            <a:endParaRPr lang="en-US"/>
+        <p:spPr>
+          <a:xfrm>
+            <a:off x="457200" y="1600200"/>
+            <a:ext cx="8229600" cy="4931229"/>
+          </a:xfrm>
+        </p:spPr>
+        <p:txBody>
+          <a:bodyPr>
+            <a:normAutofit lnSpcReduction="10000"/>
+          </a:bodyPr>
+          <a:lstStyle/>
+          <a:p>
+            <a:r>
+              <a:rPr lang="en-US" dirty="0" smtClean="0"/>
+              <a:t>Nutrient replenishment = boom-bust cycles</a:t>
+            </a:r>
+          </a:p>
+          <a:p>
+            <a:pPr lvl="1"/>
+            <a:r>
+              <a:rPr lang="en-US" dirty="0" smtClean="0"/>
+              <a:t>Different rates of resuscitation/ dormancy (i.e. migration) during  growth kinetics</a:t>
+            </a:r>
+          </a:p>
+          <a:p>
+            <a:pPr lvl="1"/>
+            <a:r>
+              <a:rPr lang="en-US" dirty="0" smtClean="0"/>
+              <a:t>Different selective pressures</a:t>
+            </a:r>
+          </a:p>
+          <a:p>
+            <a:r>
+              <a:rPr lang="en-US" dirty="0" smtClean="0"/>
+              <a:t>Have to track both population </a:t>
+            </a:r>
+            <a:r>
+              <a:rPr lang="en-US" b="1" dirty="0" smtClean="0"/>
+              <a:t>size</a:t>
+            </a:r>
+            <a:r>
+              <a:rPr lang="en-US" dirty="0" smtClean="0"/>
+              <a:t> and migration </a:t>
+            </a:r>
+            <a:r>
+              <a:rPr lang="en-US" b="1" dirty="0" smtClean="0"/>
+              <a:t>rate</a:t>
+            </a:r>
+          </a:p>
+          <a:p>
+            <a:r>
+              <a:rPr lang="en-US" dirty="0" smtClean="0"/>
+              <a:t>Risk of loosing low-frequency alleles during transfer </a:t>
+            </a:r>
+            <a:r>
+              <a:rPr lang="en-US" dirty="0"/>
+              <a:t>b</a:t>
+            </a:r>
+            <a:r>
+              <a:rPr lang="en-US" dirty="0" smtClean="0"/>
+              <a:t>ottlenecking </a:t>
+            </a:r>
+            <a:endParaRPr lang="en-US" dirty="0" smtClean="0"/>
+          </a:p>
+          <a:p>
+            <a:pPr lvl="1"/>
+            <a:r>
+              <a:rPr lang="en-US" dirty="0" smtClean="0"/>
+              <a:t>Not a theoretical issue (neutral evolution)</a:t>
+            </a:r>
+          </a:p>
+          <a:p>
+            <a:pPr lvl="1"/>
+            <a:r>
+              <a:rPr lang="en-US" dirty="0" smtClean="0"/>
+              <a:t>Issue with detecting low freq. alleles with low </a:t>
+            </a:r>
+            <a:r>
+              <a:rPr lang="el-GR" dirty="0" smtClean="0"/>
+              <a:t>μ</a:t>
+            </a:r>
+            <a:r>
+              <a:rPr lang="en-US" dirty="0" smtClean="0"/>
+              <a:t> </a:t>
+            </a:r>
           </a:p>
         </p:txBody>
       </p:sp>
     </p:spTree>
     <p:extLst>
       <p:ext uri="{BB962C8B-B14F-4D97-AF65-F5344CB8AC3E}">
-        <p14:creationId xmlns:p14="http://schemas.microsoft.com/office/powerpoint/2010/main" val="3483708241"/>
+        <p14:creationId xmlns:p14="http://schemas.microsoft.com/office/powerpoint/2010/main" val="1919697148"/>
       </p:ext>
     </p:extLst>
   </p:cSld>
@@ -6437,6 +6434,82 @@
           <a:lstStyle/>
           <a:p>
             <a:r>
+              <a:rPr lang="en-US" dirty="0" err="1" smtClean="0"/>
+              <a:t>Chemostats</a:t>
+            </a:r>
+            <a:r>
+              <a:rPr lang="en-US" dirty="0" smtClean="0"/>
+              <a:t> as a solution</a:t>
+            </a:r>
+            <a:endParaRPr lang="en-US" dirty="0"/>
+          </a:p>
+        </p:txBody>
+      </p:sp>
+      <p:sp>
+        <p:nvSpPr>
+          <p:cNvPr id="3" name="Content Placeholder 2"/>
+          <p:cNvSpPr>
+            <a:spLocks noGrp="1"/>
+          </p:cNvSpPr>
+          <p:nvPr>
+            <p:ph idx="1"/>
+          </p:nvPr>
+        </p:nvSpPr>
+        <p:spPr/>
+        <p:txBody>
+          <a:bodyPr/>
+          <a:lstStyle/>
+          <a:p>
+            <a:endParaRPr lang="en-US"/>
+          </a:p>
+        </p:txBody>
+      </p:sp>
+    </p:spTree>
+    <p:extLst>
+      <p:ext uri="{BB962C8B-B14F-4D97-AF65-F5344CB8AC3E}">
+        <p14:creationId xmlns:p14="http://schemas.microsoft.com/office/powerpoint/2010/main" val="3483708241"/>
+      </p:ext>
+    </p:extLst>
+  </p:cSld>
+  <p:clrMapOvr>
+    <a:masterClrMapping/>
+  </p:clrMapOvr>
+</p:sld>
+</file>
+
+<file path=ppt/slides/slide26.xml><?xml version="1.0" encoding="utf-8"?>
+<p:sld xmlns:a="http://schemas.openxmlformats.org/drawingml/2006/main" xmlns:r="http://schemas.openxmlformats.org/officeDocument/2006/relationships" xmlns:p="http://schemas.openxmlformats.org/presentationml/2006/main">
+  <p:cSld>
+    <p:spTree>
+      <p:nvGrpSpPr>
+        <p:cNvPr id="1" name=""/>
+        <p:cNvGrpSpPr/>
+        <p:nvPr/>
+      </p:nvGrpSpPr>
+      <p:grpSpPr>
+        <a:xfrm>
+          <a:off x="0" y="0"/>
+          <a:ext cx="0" cy="0"/>
+          <a:chOff x="0" y="0"/>
+          <a:chExt cx="0" cy="0"/>
+        </a:xfrm>
+      </p:grpSpPr>
+      <p:sp>
+        <p:nvSpPr>
+          <p:cNvPr id="2" name="Title 1"/>
+          <p:cNvSpPr>
+            <a:spLocks noGrp="1"/>
+          </p:cNvSpPr>
+          <p:nvPr>
+            <p:ph type="title"/>
+          </p:nvPr>
+        </p:nvSpPr>
+        <p:spPr/>
+        <p:txBody>
+          <a:bodyPr/>
+          <a:lstStyle/>
+          <a:p>
+            <a:r>
               <a:rPr lang="en-US" dirty="0" smtClean="0"/>
               <a:t>Which organism to test</a:t>
             </a:r>
@@ -6476,7 +6549,7 @@
 </p:sld>
 </file>
 
-<file path=ppt/slides/slide26.xml><?xml version="1.0" encoding="utf-8"?>
+<file path=ppt/slides/slide27.xml><?xml version="1.0" encoding="utf-8"?>
 <p:sld xmlns:a="http://schemas.openxmlformats.org/drawingml/2006/main" xmlns:r="http://schemas.openxmlformats.org/officeDocument/2006/relationships" xmlns:p="http://schemas.openxmlformats.org/presentationml/2006/main">
   <p:cSld>
     <p:spTree>
@@ -7354,8 +7427,8 @@
         </p:blipFill>
         <p:spPr>
           <a:xfrm>
-            <a:off x="0" y="317500"/>
-            <a:ext cx="9144000" cy="6216805"/>
+            <a:off x="789214" y="718457"/>
+            <a:ext cx="6985000" cy="2070100"/>
           </a:xfrm>
           <a:prstGeom prst="rect">
             <a:avLst/>
@@ -7365,7 +7438,7 @@
     </p:spTree>
     <p:extLst>
       <p:ext uri="{BB962C8B-B14F-4D97-AF65-F5344CB8AC3E}">
-        <p14:creationId xmlns:p14="http://schemas.microsoft.com/office/powerpoint/2010/main" val="3905866210"/>
+        <p14:creationId xmlns:p14="http://schemas.microsoft.com/office/powerpoint/2010/main" val="3953743851"/>
       </p:ext>
     </p:extLst>
   </p:cSld>

</xml_diff>